<commit_message>
Update Lab05 and Comp01
</commit_message>
<xml_diff>
--- a/labs/05_Regularization/05_Regularization_slide.pptx
+++ b/labs/05_Regularization/05_Regularization_slide.pptx
@@ -283,7 +283,7 @@
           <a:p>
             <a:fld id="{4765E3D6-48E5-4EF2-95BB-FFAB055F7B0D}" type="datetimeFigureOut">
               <a:rPr lang="zh-TW" altLang="en-US" smtClean="0"/>
-              <a:t>2023/10/11</a:t>
+              <a:t>2025/9/18</a:t>
             </a:fld>
             <a:endParaRPr lang="zh-TW" altLang="en-US"/>
           </a:p>
@@ -481,7 +481,7 @@
           <a:p>
             <a:fld id="{4765E3D6-48E5-4EF2-95BB-FFAB055F7B0D}" type="datetimeFigureOut">
               <a:rPr lang="zh-TW" altLang="en-US" smtClean="0"/>
-              <a:t>2023/10/11</a:t>
+              <a:t>2025/9/18</a:t>
             </a:fld>
             <a:endParaRPr lang="zh-TW" altLang="en-US"/>
           </a:p>
@@ -689,7 +689,7 @@
           <a:p>
             <a:fld id="{4765E3D6-48E5-4EF2-95BB-FFAB055F7B0D}" type="datetimeFigureOut">
               <a:rPr lang="zh-TW" altLang="en-US" smtClean="0"/>
-              <a:t>2023/10/11</a:t>
+              <a:t>2025/9/18</a:t>
             </a:fld>
             <a:endParaRPr lang="zh-TW" altLang="en-US"/>
           </a:p>
@@ -887,7 +887,7 @@
           <a:p>
             <a:fld id="{4765E3D6-48E5-4EF2-95BB-FFAB055F7B0D}" type="datetimeFigureOut">
               <a:rPr lang="zh-TW" altLang="en-US" smtClean="0"/>
-              <a:t>2023/10/11</a:t>
+              <a:t>2025/9/18</a:t>
             </a:fld>
             <a:endParaRPr lang="zh-TW" altLang="en-US"/>
           </a:p>
@@ -1162,7 +1162,7 @@
           <a:p>
             <a:fld id="{4765E3D6-48E5-4EF2-95BB-FFAB055F7B0D}" type="datetimeFigureOut">
               <a:rPr lang="zh-TW" altLang="en-US" smtClean="0"/>
-              <a:t>2023/10/11</a:t>
+              <a:t>2025/9/18</a:t>
             </a:fld>
             <a:endParaRPr lang="zh-TW" altLang="en-US"/>
           </a:p>
@@ -1427,7 +1427,7 @@
           <a:p>
             <a:fld id="{4765E3D6-48E5-4EF2-95BB-FFAB055F7B0D}" type="datetimeFigureOut">
               <a:rPr lang="zh-TW" altLang="en-US" smtClean="0"/>
-              <a:t>2023/10/11</a:t>
+              <a:t>2025/9/18</a:t>
             </a:fld>
             <a:endParaRPr lang="zh-TW" altLang="en-US"/>
           </a:p>
@@ -1839,7 +1839,7 @@
           <a:p>
             <a:fld id="{4765E3D6-48E5-4EF2-95BB-FFAB055F7B0D}" type="datetimeFigureOut">
               <a:rPr lang="zh-TW" altLang="en-US" smtClean="0"/>
-              <a:t>2023/10/11</a:t>
+              <a:t>2025/9/18</a:t>
             </a:fld>
             <a:endParaRPr lang="zh-TW" altLang="en-US"/>
           </a:p>
@@ -1980,7 +1980,7 @@
           <a:p>
             <a:fld id="{4765E3D6-48E5-4EF2-95BB-FFAB055F7B0D}" type="datetimeFigureOut">
               <a:rPr lang="zh-TW" altLang="en-US" smtClean="0"/>
-              <a:t>2023/10/11</a:t>
+              <a:t>2025/9/18</a:t>
             </a:fld>
             <a:endParaRPr lang="zh-TW" altLang="en-US"/>
           </a:p>
@@ -2093,7 +2093,7 @@
           <a:p>
             <a:fld id="{4765E3D6-48E5-4EF2-95BB-FFAB055F7B0D}" type="datetimeFigureOut">
               <a:rPr lang="zh-TW" altLang="en-US" smtClean="0"/>
-              <a:t>2023/10/11</a:t>
+              <a:t>2025/9/18</a:t>
             </a:fld>
             <a:endParaRPr lang="zh-TW" altLang="en-US"/>
           </a:p>
@@ -2404,7 +2404,7 @@
           <a:p>
             <a:fld id="{4765E3D6-48E5-4EF2-95BB-FFAB055F7B0D}" type="datetimeFigureOut">
               <a:rPr lang="zh-TW" altLang="en-US" smtClean="0"/>
-              <a:t>2023/10/11</a:t>
+              <a:t>2025/9/18</a:t>
             </a:fld>
             <a:endParaRPr lang="zh-TW" altLang="en-US"/>
           </a:p>
@@ -2692,7 +2692,7 @@
           <a:p>
             <a:fld id="{4765E3D6-48E5-4EF2-95BB-FFAB055F7B0D}" type="datetimeFigureOut">
               <a:rPr lang="zh-TW" altLang="en-US" smtClean="0"/>
-              <a:t>2023/10/11</a:t>
+              <a:t>2025/9/18</a:t>
             </a:fld>
             <a:endParaRPr lang="zh-TW" altLang="en-US"/>
           </a:p>
@@ -2933,7 +2933,7 @@
           <a:p>
             <a:fld id="{4765E3D6-48E5-4EF2-95BB-FFAB055F7B0D}" type="datetimeFigureOut">
               <a:rPr lang="zh-TW" altLang="en-US" smtClean="0"/>
-              <a:t>2023/10/11</a:t>
+              <a:t>2025/9/18</a:t>
             </a:fld>
             <a:endParaRPr lang="zh-TW" altLang="en-US"/>
           </a:p>
@@ -3432,7 +3432,7 @@
                   </a:schemeClr>
                 </a:solidFill>
               </a:rPr>
-              <a:t>, 2023</a:t>
+              <a:t>, 2025</a:t>
             </a:r>
           </a:p>
           <a:p>
@@ -6577,15 +6577,7 @@
             </a:r>
             <a:r>
               <a:rPr lang="en-US" altLang="zh-TW" b="1" dirty="0"/>
-              <a:t>2023-10-19 (</a:t>
-            </a:r>
-            <a:r>
-              <a:rPr lang="en-US" altLang="zh-TW" b="1" dirty="0" err="1"/>
-              <a:t>Thur</a:t>
-            </a:r>
-            <a:r>
-              <a:rPr lang="en-US" altLang="zh-TW" b="1" dirty="0"/>
-              <a:t>) 23:59</a:t>
+              <a:t>2025-09-24 (Wed) 23:59</a:t>
             </a:r>
             <a:endParaRPr lang="zh-TW" altLang="en-US" b="1" dirty="0"/>
           </a:p>

</xml_diff>